<commit_message>
fix(transitions and animations): 结题汇报.pptx
</commit_message>
<xml_diff>
--- a/researches/结题汇报.pptx
+++ b/researches/结题汇报.pptx
@@ -576,14 +576,6 @@
   <p:clrMapOvr>
     <a:masterClrMapping/>
   </p:clrMapOvr>
-  <mc:AlternateContent xmlns:mc="http://schemas.openxmlformats.org/markup-compatibility/2006" xmlns:p14="http://schemas.microsoft.com/office/powerpoint/2010/main">
-    <mc:Choice Requires="p14">
-      <p:transition spd="slow" p14:dur="2000" advTm="3000"/>
-    </mc:Choice>
-    <mc:Fallback xmlns="">
-      <p:transition spd="slow" advTm="3000"/>
-    </mc:Fallback>
-  </mc:AlternateContent>
 </p:sldLayout>
 </file>
 
@@ -3205,6 +3197,9 @@
                     <p:cTn id="3" fill="hold">
                       <p:stCondLst>
                         <p:cond delay="indefinite"/>
+                        <p:cond evt="onBegin" delay="0">
+                          <p:tn val="2"/>
+                        </p:cond>
                       </p:stCondLst>
                       <p:childTnLst>
                         <p:par>
@@ -3214,7 +3209,7 @@
                             </p:stCondLst>
                             <p:childTnLst>
                               <p:par>
-                                <p:cTn id="5" presetID="16" presetClass="entr" presetSubtype="21" fill="hold" grpId="0" nodeType="clickEffect">
+                                <p:cTn id="5" presetID="16" presetClass="entr" presetSubtype="21" fill="hold" grpId="0" nodeType="withEffect">
                                   <p:stCondLst>
                                     <p:cond delay="0"/>
                                   </p:stCondLst>
@@ -3245,6 +3240,307 @@
                                         </p:tgtEl>
                                       </p:cBhvr>
                                     </p:animEffect>
+                                  </p:childTnLst>
+                                </p:cTn>
+                              </p:par>
+                            </p:childTnLst>
+                          </p:cTn>
+                        </p:par>
+                        <p:par>
+                          <p:cTn id="8" fill="hold">
+                            <p:stCondLst>
+                              <p:cond delay="500"/>
+                            </p:stCondLst>
+                            <p:childTnLst>
+                              <p:par>
+                                <p:cTn id="9" presetID="2" presetClass="entr" presetSubtype="4" fill="hold" nodeType="afterEffect">
+                                  <p:stCondLst>
+                                    <p:cond delay="0"/>
+                                  </p:stCondLst>
+                                  <p:childTnLst>
+                                    <p:set>
+                                      <p:cBhvr>
+                                        <p:cTn id="10" dur="1" fill="hold">
+                                          <p:stCondLst>
+                                            <p:cond delay="0"/>
+                                          </p:stCondLst>
+                                        </p:cTn>
+                                        <p:tgtEl>
+                                          <p:spTgt spid="2050"/>
+                                        </p:tgtEl>
+                                        <p:attrNameLst>
+                                          <p:attrName>style.visibility</p:attrName>
+                                        </p:attrNameLst>
+                                      </p:cBhvr>
+                                      <p:to>
+                                        <p:strVal val="visible"/>
+                                      </p:to>
+                                    </p:set>
+                                    <p:anim calcmode="lin" valueType="num">
+                                      <p:cBhvr additive="base">
+                                        <p:cTn id="11" dur="500" fill="hold"/>
+                                        <p:tgtEl>
+                                          <p:spTgt spid="2050"/>
+                                        </p:tgtEl>
+                                        <p:attrNameLst>
+                                          <p:attrName>ppt_x</p:attrName>
+                                        </p:attrNameLst>
+                                      </p:cBhvr>
+                                      <p:tavLst>
+                                        <p:tav tm="0">
+                                          <p:val>
+                                            <p:strVal val="#ppt_x"/>
+                                          </p:val>
+                                        </p:tav>
+                                        <p:tav tm="100000">
+                                          <p:val>
+                                            <p:strVal val="#ppt_x"/>
+                                          </p:val>
+                                        </p:tav>
+                                      </p:tavLst>
+                                    </p:anim>
+                                    <p:anim calcmode="lin" valueType="num">
+                                      <p:cBhvr additive="base">
+                                        <p:cTn id="12" dur="500" fill="hold"/>
+                                        <p:tgtEl>
+                                          <p:spTgt spid="2050"/>
+                                        </p:tgtEl>
+                                        <p:attrNameLst>
+                                          <p:attrName>ppt_y</p:attrName>
+                                        </p:attrNameLst>
+                                      </p:cBhvr>
+                                      <p:tavLst>
+                                        <p:tav tm="0">
+                                          <p:val>
+                                            <p:strVal val="1+#ppt_h/2"/>
+                                          </p:val>
+                                        </p:tav>
+                                        <p:tav tm="100000">
+                                          <p:val>
+                                            <p:strVal val="#ppt_y"/>
+                                          </p:val>
+                                        </p:tav>
+                                      </p:tavLst>
+                                    </p:anim>
+                                  </p:childTnLst>
+                                </p:cTn>
+                              </p:par>
+                              <p:par>
+                                <p:cTn id="13" presetID="2" presetClass="entr" presetSubtype="4" fill="hold" nodeType="withEffect">
+                                  <p:stCondLst>
+                                    <p:cond delay="0"/>
+                                  </p:stCondLst>
+                                  <p:childTnLst>
+                                    <p:set>
+                                      <p:cBhvr>
+                                        <p:cTn id="14" dur="1" fill="hold">
+                                          <p:stCondLst>
+                                            <p:cond delay="0"/>
+                                          </p:stCondLst>
+                                        </p:cTn>
+                                        <p:tgtEl>
+                                          <p:spTgt spid="5"/>
+                                        </p:tgtEl>
+                                        <p:attrNameLst>
+                                          <p:attrName>style.visibility</p:attrName>
+                                        </p:attrNameLst>
+                                      </p:cBhvr>
+                                      <p:to>
+                                        <p:strVal val="visible"/>
+                                      </p:to>
+                                    </p:set>
+                                    <p:anim calcmode="lin" valueType="num">
+                                      <p:cBhvr additive="base">
+                                        <p:cTn id="15" dur="500" fill="hold"/>
+                                        <p:tgtEl>
+                                          <p:spTgt spid="5"/>
+                                        </p:tgtEl>
+                                        <p:attrNameLst>
+                                          <p:attrName>ppt_x</p:attrName>
+                                        </p:attrNameLst>
+                                      </p:cBhvr>
+                                      <p:tavLst>
+                                        <p:tav tm="0">
+                                          <p:val>
+                                            <p:strVal val="#ppt_x"/>
+                                          </p:val>
+                                        </p:tav>
+                                        <p:tav tm="100000">
+                                          <p:val>
+                                            <p:strVal val="#ppt_x"/>
+                                          </p:val>
+                                        </p:tav>
+                                      </p:tavLst>
+                                    </p:anim>
+                                    <p:anim calcmode="lin" valueType="num">
+                                      <p:cBhvr additive="base">
+                                        <p:cTn id="16" dur="500" fill="hold"/>
+                                        <p:tgtEl>
+                                          <p:spTgt spid="5"/>
+                                        </p:tgtEl>
+                                        <p:attrNameLst>
+                                          <p:attrName>ppt_y</p:attrName>
+                                        </p:attrNameLst>
+                                      </p:cBhvr>
+                                      <p:tavLst>
+                                        <p:tav tm="0">
+                                          <p:val>
+                                            <p:strVal val="1+#ppt_h/2"/>
+                                          </p:val>
+                                        </p:tav>
+                                        <p:tav tm="100000">
+                                          <p:val>
+                                            <p:strVal val="#ppt_y"/>
+                                          </p:val>
+                                        </p:tav>
+                                      </p:tavLst>
+                                    </p:anim>
+                                  </p:childTnLst>
+                                </p:cTn>
+                              </p:par>
+                              <p:par>
+                                <p:cTn id="17" presetID="2" presetClass="entr" presetSubtype="4" fill="hold" nodeType="withEffect">
+                                  <p:stCondLst>
+                                    <p:cond delay="0"/>
+                                  </p:stCondLst>
+                                  <p:childTnLst>
+                                    <p:set>
+                                      <p:cBhvr>
+                                        <p:cTn id="18" dur="1" fill="hold">
+                                          <p:stCondLst>
+                                            <p:cond delay="0"/>
+                                          </p:stCondLst>
+                                        </p:cTn>
+                                        <p:tgtEl>
+                                          <p:spTgt spid="12"/>
+                                        </p:tgtEl>
+                                        <p:attrNameLst>
+                                          <p:attrName>style.visibility</p:attrName>
+                                        </p:attrNameLst>
+                                      </p:cBhvr>
+                                      <p:to>
+                                        <p:strVal val="visible"/>
+                                      </p:to>
+                                    </p:set>
+                                    <p:anim calcmode="lin" valueType="num">
+                                      <p:cBhvr additive="base">
+                                        <p:cTn id="19" dur="500" fill="hold"/>
+                                        <p:tgtEl>
+                                          <p:spTgt spid="12"/>
+                                        </p:tgtEl>
+                                        <p:attrNameLst>
+                                          <p:attrName>ppt_x</p:attrName>
+                                        </p:attrNameLst>
+                                      </p:cBhvr>
+                                      <p:tavLst>
+                                        <p:tav tm="0">
+                                          <p:val>
+                                            <p:strVal val="#ppt_x"/>
+                                          </p:val>
+                                        </p:tav>
+                                        <p:tav tm="100000">
+                                          <p:val>
+                                            <p:strVal val="#ppt_x"/>
+                                          </p:val>
+                                        </p:tav>
+                                      </p:tavLst>
+                                    </p:anim>
+                                    <p:anim calcmode="lin" valueType="num">
+                                      <p:cBhvr additive="base">
+                                        <p:cTn id="20" dur="500" fill="hold"/>
+                                        <p:tgtEl>
+                                          <p:spTgt spid="12"/>
+                                        </p:tgtEl>
+                                        <p:attrNameLst>
+                                          <p:attrName>ppt_y</p:attrName>
+                                        </p:attrNameLst>
+                                      </p:cBhvr>
+                                      <p:tavLst>
+                                        <p:tav tm="0">
+                                          <p:val>
+                                            <p:strVal val="1+#ppt_h/2"/>
+                                          </p:val>
+                                        </p:tav>
+                                        <p:tav tm="100000">
+                                          <p:val>
+                                            <p:strVal val="#ppt_y"/>
+                                          </p:val>
+                                        </p:tav>
+                                      </p:tavLst>
+                                    </p:anim>
+                                  </p:childTnLst>
+                                </p:cTn>
+                              </p:par>
+                              <p:par>
+                                <p:cTn id="21" presetID="2" presetClass="entr" presetSubtype="4" fill="hold" nodeType="withEffect">
+                                  <p:stCondLst>
+                                    <p:cond delay="0"/>
+                                  </p:stCondLst>
+                                  <p:childTnLst>
+                                    <p:set>
+                                      <p:cBhvr>
+                                        <p:cTn id="22" dur="1" fill="hold">
+                                          <p:stCondLst>
+                                            <p:cond delay="0"/>
+                                          </p:stCondLst>
+                                        </p:cTn>
+                                        <p:tgtEl>
+                                          <p:spTgt spid="2052"/>
+                                        </p:tgtEl>
+                                        <p:attrNameLst>
+                                          <p:attrName>style.visibility</p:attrName>
+                                        </p:attrNameLst>
+                                      </p:cBhvr>
+                                      <p:to>
+                                        <p:strVal val="visible"/>
+                                      </p:to>
+                                    </p:set>
+                                    <p:anim calcmode="lin" valueType="num">
+                                      <p:cBhvr additive="base">
+                                        <p:cTn id="23" dur="500" fill="hold"/>
+                                        <p:tgtEl>
+                                          <p:spTgt spid="2052"/>
+                                        </p:tgtEl>
+                                        <p:attrNameLst>
+                                          <p:attrName>ppt_x</p:attrName>
+                                        </p:attrNameLst>
+                                      </p:cBhvr>
+                                      <p:tavLst>
+                                        <p:tav tm="0">
+                                          <p:val>
+                                            <p:strVal val="#ppt_x"/>
+                                          </p:val>
+                                        </p:tav>
+                                        <p:tav tm="100000">
+                                          <p:val>
+                                            <p:strVal val="#ppt_x"/>
+                                          </p:val>
+                                        </p:tav>
+                                      </p:tavLst>
+                                    </p:anim>
+                                    <p:anim calcmode="lin" valueType="num">
+                                      <p:cBhvr additive="base">
+                                        <p:cTn id="24" dur="500" fill="hold"/>
+                                        <p:tgtEl>
+                                          <p:spTgt spid="2052"/>
+                                        </p:tgtEl>
+                                        <p:attrNameLst>
+                                          <p:attrName>ppt_y</p:attrName>
+                                        </p:attrNameLst>
+                                      </p:cBhvr>
+                                      <p:tavLst>
+                                        <p:tav tm="0">
+                                          <p:val>
+                                            <p:strVal val="1+#ppt_h/2"/>
+                                          </p:val>
+                                        </p:tav>
+                                        <p:tav tm="100000">
+                                          <p:val>
+                                            <p:strVal val="#ppt_y"/>
+                                          </p:val>
+                                        </p:tav>
+                                      </p:tavLst>
+                                    </p:anim>
                                   </p:childTnLst>
                                 </p:cTn>
                               </p:par>
@@ -5633,92 +5929,6 @@
   <p:clrMapOvr>
     <a:masterClrMapping/>
   </p:clrMapOvr>
-  <p:timing>
-    <p:tnLst>
-      <p:par>
-        <p:cTn id="1" dur="indefinite" restart="never" nodeType="tmRoot">
-          <p:childTnLst>
-            <p:seq concurrent="1" nextAc="seek">
-              <p:cTn id="2" dur="indefinite" nodeType="mainSeq">
-                <p:childTnLst>
-                  <p:par>
-                    <p:cTn id="3" fill="hold">
-                      <p:stCondLst>
-                        <p:cond delay="indefinite"/>
-                      </p:stCondLst>
-                      <p:childTnLst>
-                        <p:par>
-                          <p:cTn id="4" fill="hold">
-                            <p:stCondLst>
-                              <p:cond delay="0"/>
-                            </p:stCondLst>
-                            <p:childTnLst>
-                              <p:par>
-                                <p:cTn id="5" presetID="22" presetClass="entr" presetSubtype="4" fill="hold" grpId="0" nodeType="clickEffect">
-                                  <p:stCondLst>
-                                    <p:cond delay="0"/>
-                                  </p:stCondLst>
-                                  <p:childTnLst>
-                                    <p:set>
-                                      <p:cBhvr>
-                                        <p:cTn id="6" dur="1" fill="hold">
-                                          <p:stCondLst>
-                                            <p:cond delay="0"/>
-                                          </p:stCondLst>
-                                        </p:cTn>
-                                        <p:tgtEl>
-                                          <p:spTgt spid="15"/>
-                                        </p:tgtEl>
-                                        <p:attrNameLst>
-                                          <p:attrName>style.visibility</p:attrName>
-                                        </p:attrNameLst>
-                                      </p:cBhvr>
-                                      <p:to>
-                                        <p:strVal val="visible"/>
-                                      </p:to>
-                                    </p:set>
-                                    <p:animEffect transition="in" filter="wipe(down)">
-                                      <p:cBhvr>
-                                        <p:cTn id="7" dur="500"/>
-                                        <p:tgtEl>
-                                          <p:spTgt spid="15"/>
-                                        </p:tgtEl>
-                                      </p:cBhvr>
-                                    </p:animEffect>
-                                  </p:childTnLst>
-                                </p:cTn>
-                              </p:par>
-                            </p:childTnLst>
-                          </p:cTn>
-                        </p:par>
-                      </p:childTnLst>
-                    </p:cTn>
-                  </p:par>
-                </p:childTnLst>
-              </p:cTn>
-              <p:prevCondLst>
-                <p:cond evt="onPrev" delay="0">
-                  <p:tgtEl>
-                    <p:sldTgt/>
-                  </p:tgtEl>
-                </p:cond>
-              </p:prevCondLst>
-              <p:nextCondLst>
-                <p:cond evt="onNext" delay="0">
-                  <p:tgtEl>
-                    <p:sldTgt/>
-                  </p:tgtEl>
-                </p:cond>
-              </p:nextCondLst>
-            </p:seq>
-          </p:childTnLst>
-        </p:cTn>
-      </p:par>
-    </p:tnLst>
-    <p:bldLst>
-      <p:bldP spid="15" grpId="0" animBg="1"/>
-    </p:bldLst>
-  </p:timing>
 </p:sld>
 </file>
 
@@ -6236,92 +6446,6 @@
   <p:clrMapOvr>
     <a:masterClrMapping/>
   </p:clrMapOvr>
-  <p:timing>
-    <p:tnLst>
-      <p:par>
-        <p:cTn id="1" dur="indefinite" restart="never" nodeType="tmRoot">
-          <p:childTnLst>
-            <p:seq concurrent="1" nextAc="seek">
-              <p:cTn id="2" dur="indefinite" nodeType="mainSeq">
-                <p:childTnLst>
-                  <p:par>
-                    <p:cTn id="3" fill="hold">
-                      <p:stCondLst>
-                        <p:cond delay="indefinite"/>
-                      </p:stCondLst>
-                      <p:childTnLst>
-                        <p:par>
-                          <p:cTn id="4" fill="hold">
-                            <p:stCondLst>
-                              <p:cond delay="0"/>
-                            </p:stCondLst>
-                            <p:childTnLst>
-                              <p:par>
-                                <p:cTn id="5" presetID="22" presetClass="entr" presetSubtype="4" fill="hold" grpId="0" nodeType="clickEffect">
-                                  <p:stCondLst>
-                                    <p:cond delay="0"/>
-                                  </p:stCondLst>
-                                  <p:childTnLst>
-                                    <p:set>
-                                      <p:cBhvr>
-                                        <p:cTn id="6" dur="1" fill="hold">
-                                          <p:stCondLst>
-                                            <p:cond delay="0"/>
-                                          </p:stCondLst>
-                                        </p:cTn>
-                                        <p:tgtEl>
-                                          <p:spTgt spid="15"/>
-                                        </p:tgtEl>
-                                        <p:attrNameLst>
-                                          <p:attrName>style.visibility</p:attrName>
-                                        </p:attrNameLst>
-                                      </p:cBhvr>
-                                      <p:to>
-                                        <p:strVal val="visible"/>
-                                      </p:to>
-                                    </p:set>
-                                    <p:animEffect transition="in" filter="wipe(down)">
-                                      <p:cBhvr>
-                                        <p:cTn id="7" dur="500"/>
-                                        <p:tgtEl>
-                                          <p:spTgt spid="15"/>
-                                        </p:tgtEl>
-                                      </p:cBhvr>
-                                    </p:animEffect>
-                                  </p:childTnLst>
-                                </p:cTn>
-                              </p:par>
-                            </p:childTnLst>
-                          </p:cTn>
-                        </p:par>
-                      </p:childTnLst>
-                    </p:cTn>
-                  </p:par>
-                </p:childTnLst>
-              </p:cTn>
-              <p:prevCondLst>
-                <p:cond evt="onPrev" delay="0">
-                  <p:tgtEl>
-                    <p:sldTgt/>
-                  </p:tgtEl>
-                </p:cond>
-              </p:prevCondLst>
-              <p:nextCondLst>
-                <p:cond evt="onNext" delay="0">
-                  <p:tgtEl>
-                    <p:sldTgt/>
-                  </p:tgtEl>
-                </p:cond>
-              </p:nextCondLst>
-            </p:seq>
-          </p:childTnLst>
-        </p:cTn>
-      </p:par>
-    </p:tnLst>
-    <p:bldLst>
-      <p:bldP spid="15" grpId="0" animBg="1"/>
-    </p:bldLst>
-  </p:timing>
 </p:sld>
 </file>
 
@@ -6797,92 +6921,6 @@
   <p:clrMapOvr>
     <a:masterClrMapping/>
   </p:clrMapOvr>
-  <p:timing>
-    <p:tnLst>
-      <p:par>
-        <p:cTn id="1" dur="indefinite" restart="never" nodeType="tmRoot">
-          <p:childTnLst>
-            <p:seq concurrent="1" nextAc="seek">
-              <p:cTn id="2" dur="indefinite" nodeType="mainSeq">
-                <p:childTnLst>
-                  <p:par>
-                    <p:cTn id="3" fill="hold">
-                      <p:stCondLst>
-                        <p:cond delay="indefinite"/>
-                      </p:stCondLst>
-                      <p:childTnLst>
-                        <p:par>
-                          <p:cTn id="4" fill="hold">
-                            <p:stCondLst>
-                              <p:cond delay="0"/>
-                            </p:stCondLst>
-                            <p:childTnLst>
-                              <p:par>
-                                <p:cTn id="5" presetID="22" presetClass="entr" presetSubtype="4" fill="hold" grpId="0" nodeType="clickEffect">
-                                  <p:stCondLst>
-                                    <p:cond delay="0"/>
-                                  </p:stCondLst>
-                                  <p:childTnLst>
-                                    <p:set>
-                                      <p:cBhvr>
-                                        <p:cTn id="6" dur="1" fill="hold">
-                                          <p:stCondLst>
-                                            <p:cond delay="0"/>
-                                          </p:stCondLst>
-                                        </p:cTn>
-                                        <p:tgtEl>
-                                          <p:spTgt spid="15"/>
-                                        </p:tgtEl>
-                                        <p:attrNameLst>
-                                          <p:attrName>style.visibility</p:attrName>
-                                        </p:attrNameLst>
-                                      </p:cBhvr>
-                                      <p:to>
-                                        <p:strVal val="visible"/>
-                                      </p:to>
-                                    </p:set>
-                                    <p:animEffect transition="in" filter="wipe(down)">
-                                      <p:cBhvr>
-                                        <p:cTn id="7" dur="500"/>
-                                        <p:tgtEl>
-                                          <p:spTgt spid="15"/>
-                                        </p:tgtEl>
-                                      </p:cBhvr>
-                                    </p:animEffect>
-                                  </p:childTnLst>
-                                </p:cTn>
-                              </p:par>
-                            </p:childTnLst>
-                          </p:cTn>
-                        </p:par>
-                      </p:childTnLst>
-                    </p:cTn>
-                  </p:par>
-                </p:childTnLst>
-              </p:cTn>
-              <p:prevCondLst>
-                <p:cond evt="onPrev" delay="0">
-                  <p:tgtEl>
-                    <p:sldTgt/>
-                  </p:tgtEl>
-                </p:cond>
-              </p:prevCondLst>
-              <p:nextCondLst>
-                <p:cond evt="onNext" delay="0">
-                  <p:tgtEl>
-                    <p:sldTgt/>
-                  </p:tgtEl>
-                </p:cond>
-              </p:nextCondLst>
-            </p:seq>
-          </p:childTnLst>
-        </p:cTn>
-      </p:par>
-    </p:tnLst>
-    <p:bldLst>
-      <p:bldP spid="15" grpId="0" animBg="1"/>
-    </p:bldLst>
-  </p:timing>
 </p:sld>
 </file>
 
@@ -7050,92 +7088,6 @@
   <p:clrMapOvr>
     <a:masterClrMapping/>
   </p:clrMapOvr>
-  <p:timing>
-    <p:tnLst>
-      <p:par>
-        <p:cTn id="1" dur="indefinite" restart="never" nodeType="tmRoot">
-          <p:childTnLst>
-            <p:seq concurrent="1" nextAc="seek">
-              <p:cTn id="2" dur="indefinite" nodeType="mainSeq">
-                <p:childTnLst>
-                  <p:par>
-                    <p:cTn id="3" fill="hold">
-                      <p:stCondLst>
-                        <p:cond delay="indefinite"/>
-                      </p:stCondLst>
-                      <p:childTnLst>
-                        <p:par>
-                          <p:cTn id="4" fill="hold">
-                            <p:stCondLst>
-                              <p:cond delay="0"/>
-                            </p:stCondLst>
-                            <p:childTnLst>
-                              <p:par>
-                                <p:cTn id="5" presetID="22" presetClass="entr" presetSubtype="4" fill="hold" grpId="0" nodeType="clickEffect">
-                                  <p:stCondLst>
-                                    <p:cond delay="0"/>
-                                  </p:stCondLst>
-                                  <p:childTnLst>
-                                    <p:set>
-                                      <p:cBhvr>
-                                        <p:cTn id="6" dur="1" fill="hold">
-                                          <p:stCondLst>
-                                            <p:cond delay="0"/>
-                                          </p:stCondLst>
-                                        </p:cTn>
-                                        <p:tgtEl>
-                                          <p:spTgt spid="15"/>
-                                        </p:tgtEl>
-                                        <p:attrNameLst>
-                                          <p:attrName>style.visibility</p:attrName>
-                                        </p:attrNameLst>
-                                      </p:cBhvr>
-                                      <p:to>
-                                        <p:strVal val="visible"/>
-                                      </p:to>
-                                    </p:set>
-                                    <p:animEffect transition="in" filter="wipe(down)">
-                                      <p:cBhvr>
-                                        <p:cTn id="7" dur="500"/>
-                                        <p:tgtEl>
-                                          <p:spTgt spid="15"/>
-                                        </p:tgtEl>
-                                      </p:cBhvr>
-                                    </p:animEffect>
-                                  </p:childTnLst>
-                                </p:cTn>
-                              </p:par>
-                            </p:childTnLst>
-                          </p:cTn>
-                        </p:par>
-                      </p:childTnLst>
-                    </p:cTn>
-                  </p:par>
-                </p:childTnLst>
-              </p:cTn>
-              <p:prevCondLst>
-                <p:cond evt="onPrev" delay="0">
-                  <p:tgtEl>
-                    <p:sldTgt/>
-                  </p:tgtEl>
-                </p:cond>
-              </p:prevCondLst>
-              <p:nextCondLst>
-                <p:cond evt="onNext" delay="0">
-                  <p:tgtEl>
-                    <p:sldTgt/>
-                  </p:tgtEl>
-                </p:cond>
-              </p:nextCondLst>
-            </p:seq>
-          </p:childTnLst>
-        </p:cTn>
-      </p:par>
-    </p:tnLst>
-    <p:bldLst>
-      <p:bldP spid="15" grpId="0" animBg="1"/>
-    </p:bldLst>
-  </p:timing>
 </p:sld>
 </file>
 
@@ -7503,92 +7455,6 @@
   <p:clrMapOvr>
     <a:masterClrMapping/>
   </p:clrMapOvr>
-  <p:timing>
-    <p:tnLst>
-      <p:par>
-        <p:cTn id="1" dur="indefinite" restart="never" nodeType="tmRoot">
-          <p:childTnLst>
-            <p:seq concurrent="1" nextAc="seek">
-              <p:cTn id="2" dur="indefinite" nodeType="mainSeq">
-                <p:childTnLst>
-                  <p:par>
-                    <p:cTn id="3" fill="hold">
-                      <p:stCondLst>
-                        <p:cond delay="indefinite"/>
-                      </p:stCondLst>
-                      <p:childTnLst>
-                        <p:par>
-                          <p:cTn id="4" fill="hold">
-                            <p:stCondLst>
-                              <p:cond delay="0"/>
-                            </p:stCondLst>
-                            <p:childTnLst>
-                              <p:par>
-                                <p:cTn id="5" presetID="22" presetClass="entr" presetSubtype="4" fill="hold" grpId="0" nodeType="clickEffect">
-                                  <p:stCondLst>
-                                    <p:cond delay="0"/>
-                                  </p:stCondLst>
-                                  <p:childTnLst>
-                                    <p:set>
-                                      <p:cBhvr>
-                                        <p:cTn id="6" dur="1" fill="hold">
-                                          <p:stCondLst>
-                                            <p:cond delay="0"/>
-                                          </p:stCondLst>
-                                        </p:cTn>
-                                        <p:tgtEl>
-                                          <p:spTgt spid="2"/>
-                                        </p:tgtEl>
-                                        <p:attrNameLst>
-                                          <p:attrName>style.visibility</p:attrName>
-                                        </p:attrNameLst>
-                                      </p:cBhvr>
-                                      <p:to>
-                                        <p:strVal val="visible"/>
-                                      </p:to>
-                                    </p:set>
-                                    <p:animEffect transition="in" filter="wipe(down)">
-                                      <p:cBhvr>
-                                        <p:cTn id="7" dur="500"/>
-                                        <p:tgtEl>
-                                          <p:spTgt spid="2"/>
-                                        </p:tgtEl>
-                                      </p:cBhvr>
-                                    </p:animEffect>
-                                  </p:childTnLst>
-                                </p:cTn>
-                              </p:par>
-                            </p:childTnLst>
-                          </p:cTn>
-                        </p:par>
-                      </p:childTnLst>
-                    </p:cTn>
-                  </p:par>
-                </p:childTnLst>
-              </p:cTn>
-              <p:prevCondLst>
-                <p:cond evt="onPrev" delay="0">
-                  <p:tgtEl>
-                    <p:sldTgt/>
-                  </p:tgtEl>
-                </p:cond>
-              </p:prevCondLst>
-              <p:nextCondLst>
-                <p:cond evt="onNext" delay="0">
-                  <p:tgtEl>
-                    <p:sldTgt/>
-                  </p:tgtEl>
-                </p:cond>
-              </p:nextCondLst>
-            </p:seq>
-          </p:childTnLst>
-        </p:cTn>
-      </p:par>
-    </p:tnLst>
-    <p:bldLst>
-      <p:bldP spid="2" grpId="0" animBg="1"/>
-    </p:bldLst>
-  </p:timing>
 </p:sld>
 </file>
 
@@ -8115,92 +7981,6 @@
   <p:clrMapOvr>
     <a:masterClrMapping/>
   </p:clrMapOvr>
-  <p:timing>
-    <p:tnLst>
-      <p:par>
-        <p:cTn id="1" dur="indefinite" restart="never" nodeType="tmRoot">
-          <p:childTnLst>
-            <p:seq concurrent="1" nextAc="seek">
-              <p:cTn id="2" dur="indefinite" nodeType="mainSeq">
-                <p:childTnLst>
-                  <p:par>
-                    <p:cTn id="3" fill="hold">
-                      <p:stCondLst>
-                        <p:cond delay="indefinite"/>
-                      </p:stCondLst>
-                      <p:childTnLst>
-                        <p:par>
-                          <p:cTn id="4" fill="hold">
-                            <p:stCondLst>
-                              <p:cond delay="0"/>
-                            </p:stCondLst>
-                            <p:childTnLst>
-                              <p:par>
-                                <p:cTn id="5" presetID="22" presetClass="entr" presetSubtype="4" fill="hold" grpId="0" nodeType="clickEffect">
-                                  <p:stCondLst>
-                                    <p:cond delay="0"/>
-                                  </p:stCondLst>
-                                  <p:childTnLst>
-                                    <p:set>
-                                      <p:cBhvr>
-                                        <p:cTn id="6" dur="1" fill="hold">
-                                          <p:stCondLst>
-                                            <p:cond delay="0"/>
-                                          </p:stCondLst>
-                                        </p:cTn>
-                                        <p:tgtEl>
-                                          <p:spTgt spid="3"/>
-                                        </p:tgtEl>
-                                        <p:attrNameLst>
-                                          <p:attrName>style.visibility</p:attrName>
-                                        </p:attrNameLst>
-                                      </p:cBhvr>
-                                      <p:to>
-                                        <p:strVal val="visible"/>
-                                      </p:to>
-                                    </p:set>
-                                    <p:animEffect transition="in" filter="wipe(down)">
-                                      <p:cBhvr>
-                                        <p:cTn id="7" dur="500"/>
-                                        <p:tgtEl>
-                                          <p:spTgt spid="3"/>
-                                        </p:tgtEl>
-                                      </p:cBhvr>
-                                    </p:animEffect>
-                                  </p:childTnLst>
-                                </p:cTn>
-                              </p:par>
-                            </p:childTnLst>
-                          </p:cTn>
-                        </p:par>
-                      </p:childTnLst>
-                    </p:cTn>
-                  </p:par>
-                </p:childTnLst>
-              </p:cTn>
-              <p:prevCondLst>
-                <p:cond evt="onPrev" delay="0">
-                  <p:tgtEl>
-                    <p:sldTgt/>
-                  </p:tgtEl>
-                </p:cond>
-              </p:prevCondLst>
-              <p:nextCondLst>
-                <p:cond evt="onNext" delay="0">
-                  <p:tgtEl>
-                    <p:sldTgt/>
-                  </p:tgtEl>
-                </p:cond>
-              </p:nextCondLst>
-            </p:seq>
-          </p:childTnLst>
-        </p:cTn>
-      </p:par>
-    </p:tnLst>
-    <p:bldLst>
-      <p:bldP spid="3" grpId="0" animBg="1"/>
-    </p:bldLst>
-  </p:timing>
 </p:sld>
 </file>
 
@@ -8561,92 +8341,6 @@
   <p:clrMapOvr>
     <a:masterClrMapping/>
   </p:clrMapOvr>
-  <p:timing>
-    <p:tnLst>
-      <p:par>
-        <p:cTn id="1" dur="indefinite" restart="never" nodeType="tmRoot">
-          <p:childTnLst>
-            <p:seq concurrent="1" nextAc="seek">
-              <p:cTn id="2" dur="indefinite" nodeType="mainSeq">
-                <p:childTnLst>
-                  <p:par>
-                    <p:cTn id="3" fill="hold">
-                      <p:stCondLst>
-                        <p:cond delay="indefinite"/>
-                      </p:stCondLst>
-                      <p:childTnLst>
-                        <p:par>
-                          <p:cTn id="4" fill="hold">
-                            <p:stCondLst>
-                              <p:cond delay="0"/>
-                            </p:stCondLst>
-                            <p:childTnLst>
-                              <p:par>
-                                <p:cTn id="5" presetID="22" presetClass="entr" presetSubtype="4" fill="hold" grpId="0" nodeType="clickEffect">
-                                  <p:stCondLst>
-                                    <p:cond delay="0"/>
-                                  </p:stCondLst>
-                                  <p:childTnLst>
-                                    <p:set>
-                                      <p:cBhvr>
-                                        <p:cTn id="6" dur="1" fill="hold">
-                                          <p:stCondLst>
-                                            <p:cond delay="0"/>
-                                          </p:stCondLst>
-                                        </p:cTn>
-                                        <p:tgtEl>
-                                          <p:spTgt spid="8"/>
-                                        </p:tgtEl>
-                                        <p:attrNameLst>
-                                          <p:attrName>style.visibility</p:attrName>
-                                        </p:attrNameLst>
-                                      </p:cBhvr>
-                                      <p:to>
-                                        <p:strVal val="visible"/>
-                                      </p:to>
-                                    </p:set>
-                                    <p:animEffect transition="in" filter="wipe(down)">
-                                      <p:cBhvr>
-                                        <p:cTn id="7" dur="500"/>
-                                        <p:tgtEl>
-                                          <p:spTgt spid="8"/>
-                                        </p:tgtEl>
-                                      </p:cBhvr>
-                                    </p:animEffect>
-                                  </p:childTnLst>
-                                </p:cTn>
-                              </p:par>
-                            </p:childTnLst>
-                          </p:cTn>
-                        </p:par>
-                      </p:childTnLst>
-                    </p:cTn>
-                  </p:par>
-                </p:childTnLst>
-              </p:cTn>
-              <p:prevCondLst>
-                <p:cond evt="onPrev" delay="0">
-                  <p:tgtEl>
-                    <p:sldTgt/>
-                  </p:tgtEl>
-                </p:cond>
-              </p:prevCondLst>
-              <p:nextCondLst>
-                <p:cond evt="onNext" delay="0">
-                  <p:tgtEl>
-                    <p:sldTgt/>
-                  </p:tgtEl>
-                </p:cond>
-              </p:nextCondLst>
-            </p:seq>
-          </p:childTnLst>
-        </p:cTn>
-      </p:par>
-    </p:tnLst>
-    <p:bldLst>
-      <p:bldP spid="8" grpId="0" animBg="1"/>
-    </p:bldLst>
-  </p:timing>
 </p:sld>
 </file>
 
@@ -8831,92 +8525,6 @@
   <p:clrMapOvr>
     <a:masterClrMapping/>
   </p:clrMapOvr>
-  <p:timing>
-    <p:tnLst>
-      <p:par>
-        <p:cTn id="1" dur="indefinite" restart="never" nodeType="tmRoot">
-          <p:childTnLst>
-            <p:seq concurrent="1" nextAc="seek">
-              <p:cTn id="2" dur="indefinite" nodeType="mainSeq">
-                <p:childTnLst>
-                  <p:par>
-                    <p:cTn id="3" fill="hold">
-                      <p:stCondLst>
-                        <p:cond delay="indefinite"/>
-                      </p:stCondLst>
-                      <p:childTnLst>
-                        <p:par>
-                          <p:cTn id="4" fill="hold">
-                            <p:stCondLst>
-                              <p:cond delay="0"/>
-                            </p:stCondLst>
-                            <p:childTnLst>
-                              <p:par>
-                                <p:cTn id="5" presetID="22" presetClass="entr" presetSubtype="4" fill="hold" grpId="0" nodeType="clickEffect">
-                                  <p:stCondLst>
-                                    <p:cond delay="0"/>
-                                  </p:stCondLst>
-                                  <p:childTnLst>
-                                    <p:set>
-                                      <p:cBhvr>
-                                        <p:cTn id="6" dur="1" fill="hold">
-                                          <p:stCondLst>
-                                            <p:cond delay="0"/>
-                                          </p:stCondLst>
-                                        </p:cTn>
-                                        <p:tgtEl>
-                                          <p:spTgt spid="9"/>
-                                        </p:tgtEl>
-                                        <p:attrNameLst>
-                                          <p:attrName>style.visibility</p:attrName>
-                                        </p:attrNameLst>
-                                      </p:cBhvr>
-                                      <p:to>
-                                        <p:strVal val="visible"/>
-                                      </p:to>
-                                    </p:set>
-                                    <p:animEffect transition="in" filter="wipe(down)">
-                                      <p:cBhvr>
-                                        <p:cTn id="7" dur="500"/>
-                                        <p:tgtEl>
-                                          <p:spTgt spid="9"/>
-                                        </p:tgtEl>
-                                      </p:cBhvr>
-                                    </p:animEffect>
-                                  </p:childTnLst>
-                                </p:cTn>
-                              </p:par>
-                            </p:childTnLst>
-                          </p:cTn>
-                        </p:par>
-                      </p:childTnLst>
-                    </p:cTn>
-                  </p:par>
-                </p:childTnLst>
-              </p:cTn>
-              <p:prevCondLst>
-                <p:cond evt="onPrev" delay="0">
-                  <p:tgtEl>
-                    <p:sldTgt/>
-                  </p:tgtEl>
-                </p:cond>
-              </p:prevCondLst>
-              <p:nextCondLst>
-                <p:cond evt="onNext" delay="0">
-                  <p:tgtEl>
-                    <p:sldTgt/>
-                  </p:tgtEl>
-                </p:cond>
-              </p:nextCondLst>
-            </p:seq>
-          </p:childTnLst>
-        </p:cTn>
-      </p:par>
-    </p:tnLst>
-    <p:bldLst>
-      <p:bldP spid="9" grpId="0" animBg="1"/>
-    </p:bldLst>
-  </p:timing>
 </p:sld>
 </file>
 
@@ -11962,92 +11570,6 @@
   <p:clrMapOvr>
     <a:masterClrMapping/>
   </p:clrMapOvr>
-  <p:timing>
-    <p:tnLst>
-      <p:par>
-        <p:cTn id="1" dur="indefinite" restart="never" nodeType="tmRoot">
-          <p:childTnLst>
-            <p:seq concurrent="1" nextAc="seek">
-              <p:cTn id="2" dur="indefinite" nodeType="mainSeq">
-                <p:childTnLst>
-                  <p:par>
-                    <p:cTn id="3" fill="hold">
-                      <p:stCondLst>
-                        <p:cond delay="indefinite"/>
-                      </p:stCondLst>
-                      <p:childTnLst>
-                        <p:par>
-                          <p:cTn id="4" fill="hold">
-                            <p:stCondLst>
-                              <p:cond delay="0"/>
-                            </p:stCondLst>
-                            <p:childTnLst>
-                              <p:par>
-                                <p:cTn id="5" presetID="22" presetClass="entr" presetSubtype="4" fill="hold" grpId="0" nodeType="clickEffect">
-                                  <p:stCondLst>
-                                    <p:cond delay="0"/>
-                                  </p:stCondLst>
-                                  <p:childTnLst>
-                                    <p:set>
-                                      <p:cBhvr>
-                                        <p:cTn id="6" dur="1" fill="hold">
-                                          <p:stCondLst>
-                                            <p:cond delay="0"/>
-                                          </p:stCondLst>
-                                        </p:cTn>
-                                        <p:tgtEl>
-                                          <p:spTgt spid="7"/>
-                                        </p:tgtEl>
-                                        <p:attrNameLst>
-                                          <p:attrName>style.visibility</p:attrName>
-                                        </p:attrNameLst>
-                                      </p:cBhvr>
-                                      <p:to>
-                                        <p:strVal val="visible"/>
-                                      </p:to>
-                                    </p:set>
-                                    <p:animEffect transition="in" filter="wipe(down)">
-                                      <p:cBhvr>
-                                        <p:cTn id="7" dur="500"/>
-                                        <p:tgtEl>
-                                          <p:spTgt spid="7"/>
-                                        </p:tgtEl>
-                                      </p:cBhvr>
-                                    </p:animEffect>
-                                  </p:childTnLst>
-                                </p:cTn>
-                              </p:par>
-                            </p:childTnLst>
-                          </p:cTn>
-                        </p:par>
-                      </p:childTnLst>
-                    </p:cTn>
-                  </p:par>
-                </p:childTnLst>
-              </p:cTn>
-              <p:prevCondLst>
-                <p:cond evt="onPrev" delay="0">
-                  <p:tgtEl>
-                    <p:sldTgt/>
-                  </p:tgtEl>
-                </p:cond>
-              </p:prevCondLst>
-              <p:nextCondLst>
-                <p:cond evt="onNext" delay="0">
-                  <p:tgtEl>
-                    <p:sldTgt/>
-                  </p:tgtEl>
-                </p:cond>
-              </p:nextCondLst>
-            </p:seq>
-          </p:childTnLst>
-        </p:cTn>
-      </p:par>
-    </p:tnLst>
-    <p:bldLst>
-      <p:bldP spid="7" grpId="0" animBg="1"/>
-    </p:bldLst>
-  </p:timing>
 </p:sld>
 </file>
 
@@ -12208,92 +11730,6 @@
   <p:clrMapOvr>
     <a:masterClrMapping/>
   </p:clrMapOvr>
-  <p:timing>
-    <p:tnLst>
-      <p:par>
-        <p:cTn id="1" dur="indefinite" restart="never" nodeType="tmRoot">
-          <p:childTnLst>
-            <p:seq concurrent="1" nextAc="seek">
-              <p:cTn id="2" dur="indefinite" nodeType="mainSeq">
-                <p:childTnLst>
-                  <p:par>
-                    <p:cTn id="3" fill="hold">
-                      <p:stCondLst>
-                        <p:cond delay="indefinite"/>
-                      </p:stCondLst>
-                      <p:childTnLst>
-                        <p:par>
-                          <p:cTn id="4" fill="hold">
-                            <p:stCondLst>
-                              <p:cond delay="0"/>
-                            </p:stCondLst>
-                            <p:childTnLst>
-                              <p:par>
-                                <p:cTn id="5" presetID="22" presetClass="entr" presetSubtype="4" fill="hold" grpId="0" nodeType="clickEffect">
-                                  <p:stCondLst>
-                                    <p:cond delay="0"/>
-                                  </p:stCondLst>
-                                  <p:childTnLst>
-                                    <p:set>
-                                      <p:cBhvr>
-                                        <p:cTn id="6" dur="1" fill="hold">
-                                          <p:stCondLst>
-                                            <p:cond delay="0"/>
-                                          </p:stCondLst>
-                                        </p:cTn>
-                                        <p:tgtEl>
-                                          <p:spTgt spid="2"/>
-                                        </p:tgtEl>
-                                        <p:attrNameLst>
-                                          <p:attrName>style.visibility</p:attrName>
-                                        </p:attrNameLst>
-                                      </p:cBhvr>
-                                      <p:to>
-                                        <p:strVal val="visible"/>
-                                      </p:to>
-                                    </p:set>
-                                    <p:animEffect transition="in" filter="wipe(down)">
-                                      <p:cBhvr>
-                                        <p:cTn id="7" dur="500"/>
-                                        <p:tgtEl>
-                                          <p:spTgt spid="2"/>
-                                        </p:tgtEl>
-                                      </p:cBhvr>
-                                    </p:animEffect>
-                                  </p:childTnLst>
-                                </p:cTn>
-                              </p:par>
-                            </p:childTnLst>
-                          </p:cTn>
-                        </p:par>
-                      </p:childTnLst>
-                    </p:cTn>
-                  </p:par>
-                </p:childTnLst>
-              </p:cTn>
-              <p:prevCondLst>
-                <p:cond evt="onPrev" delay="0">
-                  <p:tgtEl>
-                    <p:sldTgt/>
-                  </p:tgtEl>
-                </p:cond>
-              </p:prevCondLst>
-              <p:nextCondLst>
-                <p:cond evt="onNext" delay="0">
-                  <p:tgtEl>
-                    <p:sldTgt/>
-                  </p:tgtEl>
-                </p:cond>
-              </p:nextCondLst>
-            </p:seq>
-          </p:childTnLst>
-        </p:cTn>
-      </p:par>
-    </p:tnLst>
-    <p:bldLst>
-      <p:bldP spid="2" grpId="0" animBg="1"/>
-    </p:bldLst>
-  </p:timing>
 </p:sld>
 </file>
 
@@ -12614,92 +12050,6 @@
   <p:clrMapOvr>
     <a:masterClrMapping/>
   </p:clrMapOvr>
-  <p:timing>
-    <p:tnLst>
-      <p:par>
-        <p:cTn id="1" dur="indefinite" restart="never" nodeType="tmRoot">
-          <p:childTnLst>
-            <p:seq concurrent="1" nextAc="seek">
-              <p:cTn id="2" dur="indefinite" nodeType="mainSeq">
-                <p:childTnLst>
-                  <p:par>
-                    <p:cTn id="3" fill="hold">
-                      <p:stCondLst>
-                        <p:cond delay="indefinite"/>
-                      </p:stCondLst>
-                      <p:childTnLst>
-                        <p:par>
-                          <p:cTn id="4" fill="hold">
-                            <p:stCondLst>
-                              <p:cond delay="0"/>
-                            </p:stCondLst>
-                            <p:childTnLst>
-                              <p:par>
-                                <p:cTn id="5" presetID="22" presetClass="entr" presetSubtype="4" fill="hold" grpId="0" nodeType="clickEffect">
-                                  <p:stCondLst>
-                                    <p:cond delay="0"/>
-                                  </p:stCondLst>
-                                  <p:childTnLst>
-                                    <p:set>
-                                      <p:cBhvr>
-                                        <p:cTn id="6" dur="1" fill="hold">
-                                          <p:stCondLst>
-                                            <p:cond delay="0"/>
-                                          </p:stCondLst>
-                                        </p:cTn>
-                                        <p:tgtEl>
-                                          <p:spTgt spid="2"/>
-                                        </p:tgtEl>
-                                        <p:attrNameLst>
-                                          <p:attrName>style.visibility</p:attrName>
-                                        </p:attrNameLst>
-                                      </p:cBhvr>
-                                      <p:to>
-                                        <p:strVal val="visible"/>
-                                      </p:to>
-                                    </p:set>
-                                    <p:animEffect transition="in" filter="wipe(down)">
-                                      <p:cBhvr>
-                                        <p:cTn id="7" dur="500"/>
-                                        <p:tgtEl>
-                                          <p:spTgt spid="2"/>
-                                        </p:tgtEl>
-                                      </p:cBhvr>
-                                    </p:animEffect>
-                                  </p:childTnLst>
-                                </p:cTn>
-                              </p:par>
-                            </p:childTnLst>
-                          </p:cTn>
-                        </p:par>
-                      </p:childTnLst>
-                    </p:cTn>
-                  </p:par>
-                </p:childTnLst>
-              </p:cTn>
-              <p:prevCondLst>
-                <p:cond evt="onPrev" delay="0">
-                  <p:tgtEl>
-                    <p:sldTgt/>
-                  </p:tgtEl>
-                </p:cond>
-              </p:prevCondLst>
-              <p:nextCondLst>
-                <p:cond evt="onNext" delay="0">
-                  <p:tgtEl>
-                    <p:sldTgt/>
-                  </p:tgtEl>
-                </p:cond>
-              </p:nextCondLst>
-            </p:seq>
-          </p:childTnLst>
-        </p:cTn>
-      </p:par>
-    </p:tnLst>
-    <p:bldLst>
-      <p:bldP spid="2" grpId="0" animBg="1"/>
-    </p:bldLst>
-  </p:timing>
 </p:sld>
 </file>
 
@@ -12874,92 +12224,6 @@
   <p:clrMapOvr>
     <a:masterClrMapping/>
   </p:clrMapOvr>
-  <p:timing>
-    <p:tnLst>
-      <p:par>
-        <p:cTn id="1" dur="indefinite" restart="never" nodeType="tmRoot">
-          <p:childTnLst>
-            <p:seq concurrent="1" nextAc="seek">
-              <p:cTn id="2" dur="indefinite" nodeType="mainSeq">
-                <p:childTnLst>
-                  <p:par>
-                    <p:cTn id="3" fill="hold">
-                      <p:stCondLst>
-                        <p:cond delay="indefinite"/>
-                      </p:stCondLst>
-                      <p:childTnLst>
-                        <p:par>
-                          <p:cTn id="4" fill="hold">
-                            <p:stCondLst>
-                              <p:cond delay="0"/>
-                            </p:stCondLst>
-                            <p:childTnLst>
-                              <p:par>
-                                <p:cTn id="5" presetID="22" presetClass="entr" presetSubtype="4" fill="hold" grpId="0" nodeType="clickEffect">
-                                  <p:stCondLst>
-                                    <p:cond delay="0"/>
-                                  </p:stCondLst>
-                                  <p:childTnLst>
-                                    <p:set>
-                                      <p:cBhvr>
-                                        <p:cTn id="6" dur="1" fill="hold">
-                                          <p:stCondLst>
-                                            <p:cond delay="0"/>
-                                          </p:stCondLst>
-                                        </p:cTn>
-                                        <p:tgtEl>
-                                          <p:spTgt spid="2"/>
-                                        </p:tgtEl>
-                                        <p:attrNameLst>
-                                          <p:attrName>style.visibility</p:attrName>
-                                        </p:attrNameLst>
-                                      </p:cBhvr>
-                                      <p:to>
-                                        <p:strVal val="visible"/>
-                                      </p:to>
-                                    </p:set>
-                                    <p:animEffect transition="in" filter="wipe(down)">
-                                      <p:cBhvr>
-                                        <p:cTn id="7" dur="500"/>
-                                        <p:tgtEl>
-                                          <p:spTgt spid="2"/>
-                                        </p:tgtEl>
-                                      </p:cBhvr>
-                                    </p:animEffect>
-                                  </p:childTnLst>
-                                </p:cTn>
-                              </p:par>
-                            </p:childTnLst>
-                          </p:cTn>
-                        </p:par>
-                      </p:childTnLst>
-                    </p:cTn>
-                  </p:par>
-                </p:childTnLst>
-              </p:cTn>
-              <p:prevCondLst>
-                <p:cond evt="onPrev" delay="0">
-                  <p:tgtEl>
-                    <p:sldTgt/>
-                  </p:tgtEl>
-                </p:cond>
-              </p:prevCondLst>
-              <p:nextCondLst>
-                <p:cond evt="onNext" delay="0">
-                  <p:tgtEl>
-                    <p:sldTgt/>
-                  </p:tgtEl>
-                </p:cond>
-              </p:nextCondLst>
-            </p:seq>
-          </p:childTnLst>
-        </p:cTn>
-      </p:par>
-    </p:tnLst>
-    <p:bldLst>
-      <p:bldP spid="2" grpId="0" animBg="1"/>
-    </p:bldLst>
-  </p:timing>
 </p:sld>
 </file>
 
@@ -13555,92 +12819,6 @@
   <p:clrMapOvr>
     <a:masterClrMapping/>
   </p:clrMapOvr>
-  <p:timing>
-    <p:tnLst>
-      <p:par>
-        <p:cTn id="1" dur="indefinite" restart="never" nodeType="tmRoot">
-          <p:childTnLst>
-            <p:seq concurrent="1" nextAc="seek">
-              <p:cTn id="2" dur="indefinite" nodeType="mainSeq">
-                <p:childTnLst>
-                  <p:par>
-                    <p:cTn id="3" fill="hold">
-                      <p:stCondLst>
-                        <p:cond delay="indefinite"/>
-                      </p:stCondLst>
-                      <p:childTnLst>
-                        <p:par>
-                          <p:cTn id="4" fill="hold">
-                            <p:stCondLst>
-                              <p:cond delay="0"/>
-                            </p:stCondLst>
-                            <p:childTnLst>
-                              <p:par>
-                                <p:cTn id="5" presetID="22" presetClass="entr" presetSubtype="4" fill="hold" grpId="0" nodeType="clickEffect">
-                                  <p:stCondLst>
-                                    <p:cond delay="0"/>
-                                  </p:stCondLst>
-                                  <p:childTnLst>
-                                    <p:set>
-                                      <p:cBhvr>
-                                        <p:cTn id="6" dur="1" fill="hold">
-                                          <p:stCondLst>
-                                            <p:cond delay="0"/>
-                                          </p:stCondLst>
-                                        </p:cTn>
-                                        <p:tgtEl>
-                                          <p:spTgt spid="2"/>
-                                        </p:tgtEl>
-                                        <p:attrNameLst>
-                                          <p:attrName>style.visibility</p:attrName>
-                                        </p:attrNameLst>
-                                      </p:cBhvr>
-                                      <p:to>
-                                        <p:strVal val="visible"/>
-                                      </p:to>
-                                    </p:set>
-                                    <p:animEffect transition="in" filter="wipe(down)">
-                                      <p:cBhvr>
-                                        <p:cTn id="7" dur="500"/>
-                                        <p:tgtEl>
-                                          <p:spTgt spid="2"/>
-                                        </p:tgtEl>
-                                      </p:cBhvr>
-                                    </p:animEffect>
-                                  </p:childTnLst>
-                                </p:cTn>
-                              </p:par>
-                            </p:childTnLst>
-                          </p:cTn>
-                        </p:par>
-                      </p:childTnLst>
-                    </p:cTn>
-                  </p:par>
-                </p:childTnLst>
-              </p:cTn>
-              <p:prevCondLst>
-                <p:cond evt="onPrev" delay="0">
-                  <p:tgtEl>
-                    <p:sldTgt/>
-                  </p:tgtEl>
-                </p:cond>
-              </p:prevCondLst>
-              <p:nextCondLst>
-                <p:cond evt="onNext" delay="0">
-                  <p:tgtEl>
-                    <p:sldTgt/>
-                  </p:tgtEl>
-                </p:cond>
-              </p:nextCondLst>
-            </p:seq>
-          </p:childTnLst>
-        </p:cTn>
-      </p:par>
-    </p:tnLst>
-    <p:bldLst>
-      <p:bldP spid="2" grpId="0" animBg="1"/>
-    </p:bldLst>
-  </p:timing>
 </p:sld>
 </file>
 
@@ -14176,92 +13354,6 @@
   <p:clrMapOvr>
     <a:masterClrMapping/>
   </p:clrMapOvr>
-  <p:timing>
-    <p:tnLst>
-      <p:par>
-        <p:cTn id="1" dur="indefinite" restart="never" nodeType="tmRoot">
-          <p:childTnLst>
-            <p:seq concurrent="1" nextAc="seek">
-              <p:cTn id="2" dur="indefinite" nodeType="mainSeq">
-                <p:childTnLst>
-                  <p:par>
-                    <p:cTn id="3" fill="hold">
-                      <p:stCondLst>
-                        <p:cond delay="indefinite"/>
-                      </p:stCondLst>
-                      <p:childTnLst>
-                        <p:par>
-                          <p:cTn id="4" fill="hold">
-                            <p:stCondLst>
-                              <p:cond delay="0"/>
-                            </p:stCondLst>
-                            <p:childTnLst>
-                              <p:par>
-                                <p:cTn id="5" presetID="22" presetClass="entr" presetSubtype="4" fill="hold" grpId="0" nodeType="clickEffect">
-                                  <p:stCondLst>
-                                    <p:cond delay="0"/>
-                                  </p:stCondLst>
-                                  <p:childTnLst>
-                                    <p:set>
-                                      <p:cBhvr>
-                                        <p:cTn id="6" dur="1" fill="hold">
-                                          <p:stCondLst>
-                                            <p:cond delay="0"/>
-                                          </p:stCondLst>
-                                        </p:cTn>
-                                        <p:tgtEl>
-                                          <p:spTgt spid="2"/>
-                                        </p:tgtEl>
-                                        <p:attrNameLst>
-                                          <p:attrName>style.visibility</p:attrName>
-                                        </p:attrNameLst>
-                                      </p:cBhvr>
-                                      <p:to>
-                                        <p:strVal val="visible"/>
-                                      </p:to>
-                                    </p:set>
-                                    <p:animEffect transition="in" filter="wipe(down)">
-                                      <p:cBhvr>
-                                        <p:cTn id="7" dur="500"/>
-                                        <p:tgtEl>
-                                          <p:spTgt spid="2"/>
-                                        </p:tgtEl>
-                                      </p:cBhvr>
-                                    </p:animEffect>
-                                  </p:childTnLst>
-                                </p:cTn>
-                              </p:par>
-                            </p:childTnLst>
-                          </p:cTn>
-                        </p:par>
-                      </p:childTnLst>
-                    </p:cTn>
-                  </p:par>
-                </p:childTnLst>
-              </p:cTn>
-              <p:prevCondLst>
-                <p:cond evt="onPrev" delay="0">
-                  <p:tgtEl>
-                    <p:sldTgt/>
-                  </p:tgtEl>
-                </p:cond>
-              </p:prevCondLst>
-              <p:nextCondLst>
-                <p:cond evt="onNext" delay="0">
-                  <p:tgtEl>
-                    <p:sldTgt/>
-                  </p:tgtEl>
-                </p:cond>
-              </p:nextCondLst>
-            </p:seq>
-          </p:childTnLst>
-        </p:cTn>
-      </p:par>
-    </p:tnLst>
-    <p:bldLst>
-      <p:bldP spid="2" grpId="0" animBg="1"/>
-    </p:bldLst>
-  </p:timing>
 </p:sld>
 </file>
 
@@ -14582,92 +13674,6 @@
   <p:clrMapOvr>
     <a:masterClrMapping/>
   </p:clrMapOvr>
-  <p:timing>
-    <p:tnLst>
-      <p:par>
-        <p:cTn id="1" dur="indefinite" restart="never" nodeType="tmRoot">
-          <p:childTnLst>
-            <p:seq concurrent="1" nextAc="seek">
-              <p:cTn id="2" dur="indefinite" nodeType="mainSeq">
-                <p:childTnLst>
-                  <p:par>
-                    <p:cTn id="3" fill="hold">
-                      <p:stCondLst>
-                        <p:cond delay="indefinite"/>
-                      </p:stCondLst>
-                      <p:childTnLst>
-                        <p:par>
-                          <p:cTn id="4" fill="hold">
-                            <p:stCondLst>
-                              <p:cond delay="0"/>
-                            </p:stCondLst>
-                            <p:childTnLst>
-                              <p:par>
-                                <p:cTn id="5" presetID="22" presetClass="entr" presetSubtype="4" fill="hold" grpId="0" nodeType="clickEffect">
-                                  <p:stCondLst>
-                                    <p:cond delay="0"/>
-                                  </p:stCondLst>
-                                  <p:childTnLst>
-                                    <p:set>
-                                      <p:cBhvr>
-                                        <p:cTn id="6" dur="1" fill="hold">
-                                          <p:stCondLst>
-                                            <p:cond delay="0"/>
-                                          </p:stCondLst>
-                                        </p:cTn>
-                                        <p:tgtEl>
-                                          <p:spTgt spid="2"/>
-                                        </p:tgtEl>
-                                        <p:attrNameLst>
-                                          <p:attrName>style.visibility</p:attrName>
-                                        </p:attrNameLst>
-                                      </p:cBhvr>
-                                      <p:to>
-                                        <p:strVal val="visible"/>
-                                      </p:to>
-                                    </p:set>
-                                    <p:animEffect transition="in" filter="wipe(down)">
-                                      <p:cBhvr>
-                                        <p:cTn id="7" dur="500"/>
-                                        <p:tgtEl>
-                                          <p:spTgt spid="2"/>
-                                        </p:tgtEl>
-                                      </p:cBhvr>
-                                    </p:animEffect>
-                                  </p:childTnLst>
-                                </p:cTn>
-                              </p:par>
-                            </p:childTnLst>
-                          </p:cTn>
-                        </p:par>
-                      </p:childTnLst>
-                    </p:cTn>
-                  </p:par>
-                </p:childTnLst>
-              </p:cTn>
-              <p:prevCondLst>
-                <p:cond evt="onPrev" delay="0">
-                  <p:tgtEl>
-                    <p:sldTgt/>
-                  </p:tgtEl>
-                </p:cond>
-              </p:prevCondLst>
-              <p:nextCondLst>
-                <p:cond evt="onNext" delay="0">
-                  <p:tgtEl>
-                    <p:sldTgt/>
-                  </p:tgtEl>
-                </p:cond>
-              </p:nextCondLst>
-            </p:seq>
-          </p:childTnLst>
-        </p:cTn>
-      </p:par>
-    </p:tnLst>
-    <p:bldLst>
-      <p:bldP spid="2" grpId="0" animBg="1"/>
-    </p:bldLst>
-  </p:timing>
 </p:sld>
 </file>
 
@@ -14995,92 +14001,6 @@
   <p:clrMapOvr>
     <a:masterClrMapping/>
   </p:clrMapOvr>
-  <p:timing>
-    <p:tnLst>
-      <p:par>
-        <p:cTn id="1" dur="indefinite" restart="never" nodeType="tmRoot">
-          <p:childTnLst>
-            <p:seq concurrent="1" nextAc="seek">
-              <p:cTn id="2" dur="indefinite" nodeType="mainSeq">
-                <p:childTnLst>
-                  <p:par>
-                    <p:cTn id="3" fill="hold">
-                      <p:stCondLst>
-                        <p:cond delay="indefinite"/>
-                      </p:stCondLst>
-                      <p:childTnLst>
-                        <p:par>
-                          <p:cTn id="4" fill="hold">
-                            <p:stCondLst>
-                              <p:cond delay="0"/>
-                            </p:stCondLst>
-                            <p:childTnLst>
-                              <p:par>
-                                <p:cTn id="5" presetID="22" presetClass="entr" presetSubtype="4" fill="hold" grpId="0" nodeType="clickEffect">
-                                  <p:stCondLst>
-                                    <p:cond delay="0"/>
-                                  </p:stCondLst>
-                                  <p:childTnLst>
-                                    <p:set>
-                                      <p:cBhvr>
-                                        <p:cTn id="6" dur="1" fill="hold">
-                                          <p:stCondLst>
-                                            <p:cond delay="0"/>
-                                          </p:stCondLst>
-                                        </p:cTn>
-                                        <p:tgtEl>
-                                          <p:spTgt spid="2"/>
-                                        </p:tgtEl>
-                                        <p:attrNameLst>
-                                          <p:attrName>style.visibility</p:attrName>
-                                        </p:attrNameLst>
-                                      </p:cBhvr>
-                                      <p:to>
-                                        <p:strVal val="visible"/>
-                                      </p:to>
-                                    </p:set>
-                                    <p:animEffect transition="in" filter="wipe(down)">
-                                      <p:cBhvr>
-                                        <p:cTn id="7" dur="500"/>
-                                        <p:tgtEl>
-                                          <p:spTgt spid="2"/>
-                                        </p:tgtEl>
-                                      </p:cBhvr>
-                                    </p:animEffect>
-                                  </p:childTnLst>
-                                </p:cTn>
-                              </p:par>
-                            </p:childTnLst>
-                          </p:cTn>
-                        </p:par>
-                      </p:childTnLst>
-                    </p:cTn>
-                  </p:par>
-                </p:childTnLst>
-              </p:cTn>
-              <p:prevCondLst>
-                <p:cond evt="onPrev" delay="0">
-                  <p:tgtEl>
-                    <p:sldTgt/>
-                  </p:tgtEl>
-                </p:cond>
-              </p:prevCondLst>
-              <p:nextCondLst>
-                <p:cond evt="onNext" delay="0">
-                  <p:tgtEl>
-                    <p:sldTgt/>
-                  </p:tgtEl>
-                </p:cond>
-              </p:nextCondLst>
-            </p:seq>
-          </p:childTnLst>
-        </p:cTn>
-      </p:par>
-    </p:tnLst>
-    <p:bldLst>
-      <p:bldP spid="2" grpId="0" animBg="1"/>
-    </p:bldLst>
-  </p:timing>
 </p:sld>
 </file>
 
@@ -15451,92 +14371,6 @@
   <p:clrMapOvr>
     <a:masterClrMapping/>
   </p:clrMapOvr>
-  <p:timing>
-    <p:tnLst>
-      <p:par>
-        <p:cTn id="1" dur="indefinite" restart="never" nodeType="tmRoot">
-          <p:childTnLst>
-            <p:seq concurrent="1" nextAc="seek">
-              <p:cTn id="2" dur="indefinite" nodeType="mainSeq">
-                <p:childTnLst>
-                  <p:par>
-                    <p:cTn id="3" fill="hold">
-                      <p:stCondLst>
-                        <p:cond delay="indefinite"/>
-                      </p:stCondLst>
-                      <p:childTnLst>
-                        <p:par>
-                          <p:cTn id="4" fill="hold">
-                            <p:stCondLst>
-                              <p:cond delay="0"/>
-                            </p:stCondLst>
-                            <p:childTnLst>
-                              <p:par>
-                                <p:cTn id="5" presetID="22" presetClass="entr" presetSubtype="4" fill="hold" grpId="0" nodeType="clickEffect">
-                                  <p:stCondLst>
-                                    <p:cond delay="0"/>
-                                  </p:stCondLst>
-                                  <p:childTnLst>
-                                    <p:set>
-                                      <p:cBhvr>
-                                        <p:cTn id="6" dur="1" fill="hold">
-                                          <p:stCondLst>
-                                            <p:cond delay="0"/>
-                                          </p:stCondLst>
-                                        </p:cTn>
-                                        <p:tgtEl>
-                                          <p:spTgt spid="2"/>
-                                        </p:tgtEl>
-                                        <p:attrNameLst>
-                                          <p:attrName>style.visibility</p:attrName>
-                                        </p:attrNameLst>
-                                      </p:cBhvr>
-                                      <p:to>
-                                        <p:strVal val="visible"/>
-                                      </p:to>
-                                    </p:set>
-                                    <p:animEffect transition="in" filter="wipe(down)">
-                                      <p:cBhvr>
-                                        <p:cTn id="7" dur="500"/>
-                                        <p:tgtEl>
-                                          <p:spTgt spid="2"/>
-                                        </p:tgtEl>
-                                      </p:cBhvr>
-                                    </p:animEffect>
-                                  </p:childTnLst>
-                                </p:cTn>
-                              </p:par>
-                            </p:childTnLst>
-                          </p:cTn>
-                        </p:par>
-                      </p:childTnLst>
-                    </p:cTn>
-                  </p:par>
-                </p:childTnLst>
-              </p:cTn>
-              <p:prevCondLst>
-                <p:cond evt="onPrev" delay="0">
-                  <p:tgtEl>
-                    <p:sldTgt/>
-                  </p:tgtEl>
-                </p:cond>
-              </p:prevCondLst>
-              <p:nextCondLst>
-                <p:cond evt="onNext" delay="0">
-                  <p:tgtEl>
-                    <p:sldTgt/>
-                  </p:tgtEl>
-                </p:cond>
-              </p:nextCondLst>
-            </p:seq>
-          </p:childTnLst>
-        </p:cTn>
-      </p:par>
-    </p:tnLst>
-    <p:bldLst>
-      <p:bldP spid="2" grpId="0" animBg="1"/>
-    </p:bldLst>
-  </p:timing>
 </p:sld>
 </file>
 
@@ -15628,92 +14462,6 @@
   <p:clrMapOvr>
     <a:masterClrMapping/>
   </p:clrMapOvr>
-  <p:timing>
-    <p:tnLst>
-      <p:par>
-        <p:cTn id="1" dur="indefinite" restart="never" nodeType="tmRoot">
-          <p:childTnLst>
-            <p:seq concurrent="1" nextAc="seek">
-              <p:cTn id="2" dur="indefinite" nodeType="mainSeq">
-                <p:childTnLst>
-                  <p:par>
-                    <p:cTn id="3" fill="hold">
-                      <p:stCondLst>
-                        <p:cond delay="indefinite"/>
-                      </p:stCondLst>
-                      <p:childTnLst>
-                        <p:par>
-                          <p:cTn id="4" fill="hold">
-                            <p:stCondLst>
-                              <p:cond delay="0"/>
-                            </p:stCondLst>
-                            <p:childTnLst>
-                              <p:par>
-                                <p:cTn id="5" presetID="22" presetClass="entr" presetSubtype="4" fill="hold" grpId="0" nodeType="clickEffect">
-                                  <p:stCondLst>
-                                    <p:cond delay="0"/>
-                                  </p:stCondLst>
-                                  <p:childTnLst>
-                                    <p:set>
-                                      <p:cBhvr>
-                                        <p:cTn id="6" dur="1" fill="hold">
-                                          <p:stCondLst>
-                                            <p:cond delay="0"/>
-                                          </p:stCondLst>
-                                        </p:cTn>
-                                        <p:tgtEl>
-                                          <p:spTgt spid="2"/>
-                                        </p:tgtEl>
-                                        <p:attrNameLst>
-                                          <p:attrName>style.visibility</p:attrName>
-                                        </p:attrNameLst>
-                                      </p:cBhvr>
-                                      <p:to>
-                                        <p:strVal val="visible"/>
-                                      </p:to>
-                                    </p:set>
-                                    <p:animEffect transition="in" filter="wipe(down)">
-                                      <p:cBhvr>
-                                        <p:cTn id="7" dur="500"/>
-                                        <p:tgtEl>
-                                          <p:spTgt spid="2"/>
-                                        </p:tgtEl>
-                                      </p:cBhvr>
-                                    </p:animEffect>
-                                  </p:childTnLst>
-                                </p:cTn>
-                              </p:par>
-                            </p:childTnLst>
-                          </p:cTn>
-                        </p:par>
-                      </p:childTnLst>
-                    </p:cTn>
-                  </p:par>
-                </p:childTnLst>
-              </p:cTn>
-              <p:prevCondLst>
-                <p:cond evt="onPrev" delay="0">
-                  <p:tgtEl>
-                    <p:sldTgt/>
-                  </p:tgtEl>
-                </p:cond>
-              </p:prevCondLst>
-              <p:nextCondLst>
-                <p:cond evt="onNext" delay="0">
-                  <p:tgtEl>
-                    <p:sldTgt/>
-                  </p:tgtEl>
-                </p:cond>
-              </p:nextCondLst>
-            </p:seq>
-          </p:childTnLst>
-        </p:cTn>
-      </p:par>
-    </p:tnLst>
-    <p:bldLst>
-      <p:bldP spid="2" grpId="0" animBg="1"/>
-    </p:bldLst>
-  </p:timing>
 </p:sld>
 </file>
 
@@ -16973,14 +15721,6 @@
   <p:clrMapOvr>
     <a:masterClrMapping/>
   </p:clrMapOvr>
-  <mc:AlternateContent xmlns:mc="http://schemas.openxmlformats.org/markup-compatibility/2006" xmlns:p14="http://schemas.microsoft.com/office/powerpoint/2010/main">
-    <mc:Choice Requires="p14">
-      <p:transition spd="slow" p14:dur="2000" advTm="3000"/>
-    </mc:Choice>
-    <mc:Fallback xmlns="">
-      <p:transition spd="slow" advTm="3000"/>
-    </mc:Fallback>
-  </mc:AlternateContent>
   <p:timing>
     <p:tnLst>
       <p:par>
@@ -17171,92 +15911,6 @@
   <p:clrMapOvr>
     <a:masterClrMapping/>
   </p:clrMapOvr>
-  <p:timing>
-    <p:tnLst>
-      <p:par>
-        <p:cTn id="1" dur="indefinite" restart="never" nodeType="tmRoot">
-          <p:childTnLst>
-            <p:seq concurrent="1" nextAc="seek">
-              <p:cTn id="2" dur="indefinite" nodeType="mainSeq">
-                <p:childTnLst>
-                  <p:par>
-                    <p:cTn id="3" fill="hold">
-                      <p:stCondLst>
-                        <p:cond delay="indefinite"/>
-                      </p:stCondLst>
-                      <p:childTnLst>
-                        <p:par>
-                          <p:cTn id="4" fill="hold">
-                            <p:stCondLst>
-                              <p:cond delay="0"/>
-                            </p:stCondLst>
-                            <p:childTnLst>
-                              <p:par>
-                                <p:cTn id="5" presetID="22" presetClass="entr" presetSubtype="4" fill="hold" grpId="0" nodeType="clickEffect">
-                                  <p:stCondLst>
-                                    <p:cond delay="0"/>
-                                  </p:stCondLst>
-                                  <p:childTnLst>
-                                    <p:set>
-                                      <p:cBhvr>
-                                        <p:cTn id="6" dur="1" fill="hold">
-                                          <p:stCondLst>
-                                            <p:cond delay="0"/>
-                                          </p:stCondLst>
-                                        </p:cTn>
-                                        <p:tgtEl>
-                                          <p:spTgt spid="2"/>
-                                        </p:tgtEl>
-                                        <p:attrNameLst>
-                                          <p:attrName>style.visibility</p:attrName>
-                                        </p:attrNameLst>
-                                      </p:cBhvr>
-                                      <p:to>
-                                        <p:strVal val="visible"/>
-                                      </p:to>
-                                    </p:set>
-                                    <p:animEffect transition="in" filter="wipe(down)">
-                                      <p:cBhvr>
-                                        <p:cTn id="7" dur="500"/>
-                                        <p:tgtEl>
-                                          <p:spTgt spid="2"/>
-                                        </p:tgtEl>
-                                      </p:cBhvr>
-                                    </p:animEffect>
-                                  </p:childTnLst>
-                                </p:cTn>
-                              </p:par>
-                            </p:childTnLst>
-                          </p:cTn>
-                        </p:par>
-                      </p:childTnLst>
-                    </p:cTn>
-                  </p:par>
-                </p:childTnLst>
-              </p:cTn>
-              <p:prevCondLst>
-                <p:cond evt="onPrev" delay="0">
-                  <p:tgtEl>
-                    <p:sldTgt/>
-                  </p:tgtEl>
-                </p:cond>
-              </p:prevCondLst>
-              <p:nextCondLst>
-                <p:cond evt="onNext" delay="0">
-                  <p:tgtEl>
-                    <p:sldTgt/>
-                  </p:tgtEl>
-                </p:cond>
-              </p:nextCondLst>
-            </p:seq>
-          </p:childTnLst>
-        </p:cTn>
-      </p:par>
-    </p:tnLst>
-    <p:bldLst>
-      <p:bldP spid="2" grpId="0" animBg="1"/>
-    </p:bldLst>
-  </p:timing>
 </p:sld>
 </file>
 
@@ -21526,14 +20180,6 @@
   <p:clrMapOvr>
     <a:masterClrMapping/>
   </p:clrMapOvr>
-  <mc:AlternateContent xmlns:mc="http://schemas.openxmlformats.org/markup-compatibility/2006" xmlns:p14="http://schemas.microsoft.com/office/powerpoint/2010/main">
-    <mc:Choice Requires="p14">
-      <p:transition spd="slow" p14:dur="2000" advTm="3000"/>
-    </mc:Choice>
-    <mc:Fallback xmlns="">
-      <p:transition spd="slow" advTm="3000"/>
-    </mc:Fallback>
-  </mc:AlternateContent>
 </p:sld>
 </file>
 
@@ -21746,24 +20392,15 @@
             </a:lvl9pPr>
           </a:lstStyle>
           <a:p>
-            <a:pPr marL="342900" marR="0" lvl="0" indent="-342900" algn="l" defTabSz="914400" rtl="0" eaLnBrk="0" fontAlgn="base" latinLnBrk="0" hangingPunct="0">
+            <a:pPr marL="342900" lvl="0" indent="-342900">
               <a:lnSpc>
                 <a:spcPct val="150000"/>
               </a:lnSpc>
-              <a:spcBef>
-                <a:spcPct val="0"/>
-              </a:spcBef>
-              <a:spcAft>
-                <a:spcPct val="0"/>
-              </a:spcAft>
-              <a:buClrTx/>
-              <a:buSzTx/>
               <a:buFont typeface="Wingdings" panose="05000000000000000000" pitchFamily="2" charset="2"/>
               <a:buChar char="l"/>
-              <a:tabLst/>
             </a:pPr>
             <a:r>
-              <a:rPr lang="zh-CN" altLang="zh-CN" sz="2400" dirty="0">
+              <a:rPr lang="zh-CN" altLang="en-US" sz="2400" dirty="0">
                 <a:solidFill>
                   <a:schemeClr val="tx1">
                     <a:lumMod val="65000"/>
@@ -21772,7 +20409,43 @@
                 </a:solidFill>
                 <a:ea typeface="思源黑体 CN Normal" panose="020B0400000000000000" pitchFamily="34" charset="-122"/>
               </a:rPr>
-              <a:t>本次大作业时间紧迫，部分功能距离预期有一定差距，但仍然实现了期望目标的主要功能，包括文件系统、进程调度和内存分配，填补了原先项目的空白。后续的ArceOS开发者可以基于这些功能开发更多、更丰富的模块，壮大ArceOS的生态圈。</a:t>
+              <a:t>​本次大作业虽未成功实现硬件部分，</a:t>
+            </a:r>
+            <a:r>
+              <a:rPr lang="zh-CN" altLang="zh-CN" sz="2400" dirty="0">
+                <a:solidFill>
+                  <a:schemeClr val="tx1">
+                    <a:lumMod val="65000"/>
+                    <a:lumOff val="35000"/>
+                  </a:schemeClr>
+                </a:solidFill>
+                <a:ea typeface="思源黑体 CN Normal" panose="020B0400000000000000" pitchFamily="34" charset="-122"/>
+              </a:rPr>
+              <a:t>但仍然实现了期望目标的主要功</a:t>
+            </a:r>
+            <a:r>
+              <a:rPr lang="zh-CN" altLang="en-US" sz="2400" dirty="0">
+                <a:solidFill>
+                  <a:schemeClr val="tx1">
+                    <a:lumMod val="65000"/>
+                    <a:lumOff val="35000"/>
+                  </a:schemeClr>
+                </a:solidFill>
+                <a:ea typeface="思源黑体 CN Normal" panose="020B0400000000000000" pitchFamily="34" charset="-122"/>
+              </a:rPr>
+              <a:t>能，</a:t>
+            </a:r>
+            <a:r>
+              <a:rPr lang="zh-CN" altLang="zh-CN" sz="2400" dirty="0">
+                <a:solidFill>
+                  <a:schemeClr val="tx1">
+                    <a:lumMod val="65000"/>
+                    <a:lumOff val="35000"/>
+                  </a:schemeClr>
+                </a:solidFill>
+                <a:ea typeface="思源黑体 CN Normal" panose="020B0400000000000000" pitchFamily="34" charset="-122"/>
+              </a:rPr>
+              <a:t>包括文件系统、进程调度和内存分配，填补了原先项目的空白。后续的ArceOS开发者可以基于这些功能开发更多、更丰富的模块，壮大ArceOS的生态圈。</a:t>
             </a:r>
             <a:endParaRPr lang="en-US" altLang="zh-CN" sz="2400" dirty="0">
               <a:solidFill>
@@ -21905,130 +20578,6 @@
   <p:clrMapOvr>
     <a:masterClrMapping/>
   </p:clrMapOvr>
-  <p:timing>
-    <p:tnLst>
-      <p:par>
-        <p:cTn id="1" dur="indefinite" restart="never" nodeType="tmRoot">
-          <p:childTnLst>
-            <p:seq concurrent="1" nextAc="seek">
-              <p:cTn id="2" dur="indefinite" nodeType="mainSeq">
-                <p:childTnLst>
-                  <p:par>
-                    <p:cTn id="3" fill="hold">
-                      <p:stCondLst>
-                        <p:cond delay="indefinite"/>
-                      </p:stCondLst>
-                      <p:childTnLst>
-                        <p:par>
-                          <p:cTn id="4" fill="hold">
-                            <p:stCondLst>
-                              <p:cond delay="0"/>
-                            </p:stCondLst>
-                            <p:childTnLst>
-                              <p:par>
-                                <p:cTn id="5" presetID="2" presetClass="entr" presetSubtype="4" fill="hold" grpId="0" nodeType="clickEffect">
-                                  <p:stCondLst>
-                                    <p:cond delay="0"/>
-                                  </p:stCondLst>
-                                  <p:childTnLst>
-                                    <p:set>
-                                      <p:cBhvr>
-                                        <p:cTn id="6" dur="1" fill="hold">
-                                          <p:stCondLst>
-                                            <p:cond delay="0"/>
-                                          </p:stCondLst>
-                                        </p:cTn>
-                                        <p:tgtEl>
-                                          <p:spTgt spid="4"/>
-                                        </p:tgtEl>
-                                        <p:attrNameLst>
-                                          <p:attrName>style.visibility</p:attrName>
-                                        </p:attrNameLst>
-                                      </p:cBhvr>
-                                      <p:to>
-                                        <p:strVal val="visible"/>
-                                      </p:to>
-                                    </p:set>
-                                    <p:anim calcmode="lin" valueType="num">
-                                      <p:cBhvr additive="base">
-                                        <p:cTn id="7" dur="500" fill="hold"/>
-                                        <p:tgtEl>
-                                          <p:spTgt spid="4"/>
-                                        </p:tgtEl>
-                                        <p:attrNameLst>
-                                          <p:attrName>ppt_x</p:attrName>
-                                        </p:attrNameLst>
-                                      </p:cBhvr>
-                                      <p:tavLst>
-                                        <p:tav tm="0">
-                                          <p:val>
-                                            <p:strVal val="#ppt_x"/>
-                                          </p:val>
-                                        </p:tav>
-                                        <p:tav tm="100000">
-                                          <p:val>
-                                            <p:strVal val="#ppt_x"/>
-                                          </p:val>
-                                        </p:tav>
-                                      </p:tavLst>
-                                    </p:anim>
-                                    <p:anim calcmode="lin" valueType="num">
-                                      <p:cBhvr additive="base">
-                                        <p:cTn id="8" dur="500" fill="hold"/>
-                                        <p:tgtEl>
-                                          <p:spTgt spid="4"/>
-                                        </p:tgtEl>
-                                        <p:attrNameLst>
-                                          <p:attrName>ppt_y</p:attrName>
-                                        </p:attrNameLst>
-                                      </p:cBhvr>
-                                      <p:tavLst>
-                                        <p:tav tm="0">
-                                          <p:val>
-                                            <p:strVal val="1+#ppt_h/2"/>
-                                          </p:val>
-                                        </p:tav>
-                                        <p:tav tm="100000">
-                                          <p:val>
-                                            <p:strVal val="#ppt_y"/>
-                                          </p:val>
-                                        </p:tav>
-                                      </p:tavLst>
-                                    </p:anim>
-                                  </p:childTnLst>
-                                </p:cTn>
-                              </p:par>
-                            </p:childTnLst>
-                          </p:cTn>
-                        </p:par>
-                      </p:childTnLst>
-                    </p:cTn>
-                  </p:par>
-                </p:childTnLst>
-              </p:cTn>
-              <p:prevCondLst>
-                <p:cond evt="onPrev" delay="0">
-                  <p:tgtEl>
-                    <p:sldTgt/>
-                  </p:tgtEl>
-                </p:cond>
-              </p:prevCondLst>
-              <p:nextCondLst>
-                <p:cond evt="onNext" delay="0">
-                  <p:tgtEl>
-                    <p:sldTgt/>
-                  </p:tgtEl>
-                </p:cond>
-              </p:nextCondLst>
-            </p:seq>
-          </p:childTnLst>
-        </p:cTn>
-      </p:par>
-    </p:tnLst>
-    <p:bldLst>
-      <p:bldP spid="4" grpId="0" animBg="1"/>
-    </p:bldLst>
-  </p:timing>
 </p:sld>
 </file>
 
@@ -25243,14 +23792,6 @@
   <p:clrMapOvr>
     <a:masterClrMapping/>
   </p:clrMapOvr>
-  <mc:AlternateContent xmlns:mc="http://schemas.openxmlformats.org/markup-compatibility/2006" xmlns:p14="http://schemas.microsoft.com/office/powerpoint/2010/main">
-    <mc:Choice Requires="p14">
-      <p:transition spd="slow" p14:dur="2000" advTm="3000"/>
-    </mc:Choice>
-    <mc:Fallback xmlns="">
-      <p:transition spd="slow" advTm="3000"/>
-    </mc:Fallback>
-  </mc:AlternateContent>
   <p:timing>
     <p:tnLst>
       <p:par>
@@ -26734,7 +25275,7 @@
         </p:nvSpPr>
         <p:spPr>
           <a:xfrm>
-            <a:off x="7033502" y="5651978"/>
+            <a:off x="7033502" y="5644520"/>
             <a:ext cx="1782502" cy="307977"/>
           </a:xfrm>
           <a:prstGeom prst="rightArrow">
@@ -26783,8 +25324,8 @@
         </p:nvSpPr>
         <p:spPr>
           <a:xfrm>
-            <a:off x="9223915" y="5383012"/>
-            <a:ext cx="1216954" cy="830997"/>
+            <a:off x="9223915" y="5567677"/>
+            <a:ext cx="1412263" cy="461665"/>
           </a:xfrm>
           <a:prstGeom prst="rect">
             <a:avLst/>
@@ -26804,7 +25345,7 @@
                 </a:solidFill>
                 <a:ea typeface="思源黑体 CN Medium" panose="020B0600000000000000"/>
               </a:rPr>
-              <a:t>Unikernel</a:t>
+              <a:t>Unikenel</a:t>
             </a:r>
             <a:endParaRPr lang="zh-CN" altLang="en-US" sz="2400" b="1" dirty="0">
               <a:solidFill>
@@ -28279,6 +26820,9 @@
                     <p:cTn id="3" fill="hold">
                       <p:stCondLst>
                         <p:cond delay="indefinite"/>
+                        <p:cond evt="onBegin" delay="0">
+                          <p:tn val="2"/>
+                        </p:cond>
                       </p:stCondLst>
                       <p:childTnLst>
                         <p:par>
@@ -28288,7 +26832,7 @@
                             </p:stCondLst>
                             <p:childTnLst>
                               <p:par>
-                                <p:cTn id="5" presetID="2" presetClass="entr" presetSubtype="4" fill="hold" grpId="0" nodeType="clickEffect">
+                                <p:cTn id="5" presetID="2" presetClass="entr" presetSubtype="4" fill="hold" grpId="0" nodeType="withEffect">
                                   <p:stCondLst>
                                     <p:cond delay="0"/>
                                   </p:stCondLst>
@@ -28766,6 +27310,9 @@
                     <p:cTn id="3" fill="hold">
                       <p:stCondLst>
                         <p:cond delay="indefinite"/>
+                        <p:cond evt="onBegin" delay="0">
+                          <p:tn val="2"/>
+                        </p:cond>
                       </p:stCondLst>
                       <p:childTnLst>
                         <p:par>
@@ -28775,7 +27322,7 @@
                             </p:stCondLst>
                             <p:childTnLst>
                               <p:par>
-                                <p:cTn id="5" presetID="2" presetClass="entr" presetSubtype="4" fill="hold" grpId="0" nodeType="clickEffect">
+                                <p:cTn id="5" presetID="2" presetClass="entr" presetSubtype="4" fill="hold" grpId="0" nodeType="withEffect">
                                   <p:stCondLst>
                                     <p:cond delay="0"/>
                                   </p:stCondLst>
@@ -30124,6 +28671,9 @@
                     <p:cTn id="3" fill="hold">
                       <p:stCondLst>
                         <p:cond delay="indefinite"/>
+                        <p:cond evt="onBegin" delay="0">
+                          <p:tn val="2"/>
+                        </p:cond>
                       </p:stCondLst>
                       <p:childTnLst>
                         <p:par>
@@ -30133,7 +28683,7 @@
                             </p:stCondLst>
                             <p:childTnLst>
                               <p:par>
-                                <p:cTn id="5" presetID="22" presetClass="entr" presetSubtype="4" fill="hold" grpId="0" nodeType="clickEffect">
+                                <p:cTn id="5" presetID="22" presetClass="entr" presetSubtype="4" fill="hold" grpId="0" nodeType="withEffect">
                                   <p:stCondLst>
                                     <p:cond delay="0"/>
                                   </p:stCondLst>
@@ -30170,30 +28720,21 @@
                             </p:childTnLst>
                           </p:cTn>
                         </p:par>
-                      </p:childTnLst>
-                    </p:cTn>
-                  </p:par>
-                  <p:par>
-                    <p:cTn id="8" fill="hold">
-                      <p:stCondLst>
-                        <p:cond delay="indefinite"/>
-                      </p:stCondLst>
-                      <p:childTnLst>
                         <p:par>
-                          <p:cTn id="9" fill="hold">
+                          <p:cTn id="8" fill="hold">
                             <p:stCondLst>
-                              <p:cond delay="0"/>
+                              <p:cond delay="500"/>
                             </p:stCondLst>
                             <p:childTnLst>
                               <p:par>
-                                <p:cTn id="10" presetID="10" presetClass="entr" presetSubtype="0" fill="hold" nodeType="clickEffect">
+                                <p:cTn id="9" presetID="10" presetClass="entr" presetSubtype="0" fill="hold" nodeType="afterEffect">
                                   <p:stCondLst>
                                     <p:cond delay="0"/>
                                   </p:stCondLst>
                                   <p:childTnLst>
                                     <p:set>
                                       <p:cBhvr>
-                                        <p:cTn id="11" dur="1" fill="hold">
+                                        <p:cTn id="10" dur="1" fill="hold">
                                           <p:stCondLst>
                                             <p:cond delay="0"/>
                                           </p:stCondLst>
@@ -30211,7 +28752,7 @@
                                     </p:set>
                                     <p:animEffect transition="in" filter="fade">
                                       <p:cBhvr>
-                                        <p:cTn id="12" dur="500"/>
+                                        <p:cTn id="11" dur="500"/>
                                         <p:tgtEl>
                                           <p:spTgt spid="2"/>
                                         </p:tgtEl>
@@ -30224,20 +28765,20 @@
                           </p:cTn>
                         </p:par>
                         <p:par>
-                          <p:cTn id="13" fill="hold">
+                          <p:cTn id="12" fill="hold">
                             <p:stCondLst>
-                              <p:cond delay="500"/>
+                              <p:cond delay="1000"/>
                             </p:stCondLst>
                             <p:childTnLst>
                               <p:par>
-                                <p:cTn id="14" presetID="10" presetClass="entr" presetSubtype="0" fill="hold" nodeType="afterEffect">
+                                <p:cTn id="13" presetID="10" presetClass="entr" presetSubtype="0" fill="hold" nodeType="afterEffect">
                                   <p:stCondLst>
                                     <p:cond delay="0"/>
                                   </p:stCondLst>
                                   <p:childTnLst>
                                     <p:set>
                                       <p:cBhvr>
-                                        <p:cTn id="15" dur="1" fill="hold">
+                                        <p:cTn id="14" dur="1" fill="hold">
                                           <p:stCondLst>
                                             <p:cond delay="0"/>
                                           </p:stCondLst>
@@ -30255,7 +28796,7 @@
                                     </p:set>
                                     <p:animEffect transition="in" filter="fade">
                                       <p:cBhvr>
-                                        <p:cTn id="16" dur="500"/>
+                                        <p:cTn id="15" dur="500"/>
                                         <p:tgtEl>
                                           <p:spTgt spid="19"/>
                                         </p:tgtEl>
@@ -30268,20 +28809,20 @@
                           </p:cTn>
                         </p:par>
                         <p:par>
-                          <p:cTn id="17" fill="hold">
+                          <p:cTn id="16" fill="hold">
                             <p:stCondLst>
-                              <p:cond delay="1000"/>
+                              <p:cond delay="1500"/>
                             </p:stCondLst>
                             <p:childTnLst>
                               <p:par>
-                                <p:cTn id="18" presetID="10" presetClass="entr" presetSubtype="0" fill="hold" nodeType="afterEffect">
+                                <p:cTn id="17" presetID="10" presetClass="entr" presetSubtype="0" fill="hold" nodeType="afterEffect">
                                   <p:stCondLst>
                                     <p:cond delay="0"/>
                                   </p:stCondLst>
                                   <p:childTnLst>
                                     <p:set>
                                       <p:cBhvr>
-                                        <p:cTn id="19" dur="1" fill="hold">
+                                        <p:cTn id="18" dur="1" fill="hold">
                                           <p:stCondLst>
                                             <p:cond delay="0"/>
                                           </p:stCondLst>
@@ -30299,7 +28840,7 @@
                                     </p:set>
                                     <p:animEffect transition="in" filter="fade">
                                       <p:cBhvr>
-                                        <p:cTn id="20" dur="500"/>
+                                        <p:cTn id="19" dur="500"/>
                                         <p:tgtEl>
                                           <p:spTgt spid="23"/>
                                         </p:tgtEl>
@@ -30312,20 +28853,20 @@
                           </p:cTn>
                         </p:par>
                         <p:par>
-                          <p:cTn id="21" fill="hold">
+                          <p:cTn id="20" fill="hold">
                             <p:stCondLst>
-                              <p:cond delay="1500"/>
+                              <p:cond delay="2000"/>
                             </p:stCondLst>
                             <p:childTnLst>
                               <p:par>
-                                <p:cTn id="22" presetID="10" presetClass="entr" presetSubtype="0" fill="hold" nodeType="afterEffect">
+                                <p:cTn id="21" presetID="10" presetClass="entr" presetSubtype="0" fill="hold" nodeType="afterEffect">
                                   <p:stCondLst>
                                     <p:cond delay="0"/>
                                   </p:stCondLst>
                                   <p:childTnLst>
                                     <p:set>
                                       <p:cBhvr>
-                                        <p:cTn id="23" dur="1" fill="hold">
+                                        <p:cTn id="22" dur="1" fill="hold">
                                           <p:stCondLst>
                                             <p:cond delay="0"/>
                                           </p:stCondLst>
@@ -30343,7 +28884,7 @@
                                     </p:set>
                                     <p:animEffect transition="in" filter="fade">
                                       <p:cBhvr>
-                                        <p:cTn id="24" dur="500"/>
+                                        <p:cTn id="23" dur="500"/>
                                         <p:tgtEl>
                                           <p:spTgt spid="61"/>
                                         </p:tgtEl>
@@ -31243,6 +29784,9 @@
                     <p:cTn id="3" fill="hold">
                       <p:stCondLst>
                         <p:cond delay="indefinite"/>
+                        <p:cond evt="onBegin" delay="0">
+                          <p:tn val="2"/>
+                        </p:cond>
                       </p:stCondLst>
                       <p:childTnLst>
                         <p:par>
@@ -31252,7 +29796,7 @@
                             </p:stCondLst>
                             <p:childTnLst>
                               <p:par>
-                                <p:cTn id="5" presetID="16" presetClass="entr" presetSubtype="21" fill="hold" grpId="0" nodeType="clickEffect">
+                                <p:cTn id="5" presetID="16" presetClass="entr" presetSubtype="21" fill="hold" grpId="0" nodeType="withEffect">
                                   <p:stCondLst>
                                     <p:cond delay="0"/>
                                   </p:stCondLst>

</xml_diff>